<commit_message>
abstract and presentation updates
</commit_message>
<xml_diff>
--- a/presentation.pptx
+++ b/presentation.pptx
@@ -331,7 +331,7 @@
           <a:p>
             <a:fld id="{4AAD347D-5ACD-4C99-B74B-A9C85AD731AF}" type="datetimeFigureOut">
               <a:rPr lang="en-US" dirty="0"/>
-              <a:t>12/15/2017</a:t>
+              <a:t>12/21/2017</a:t>
             </a:fld>
             <a:endParaRPr lang="en-US" dirty="0"/>
           </a:p>
@@ -601,7 +601,7 @@
           <a:p>
             <a:fld id="{4509A250-FF31-4206-8172-F9D3106AACB1}" type="datetimeFigureOut">
               <a:rPr lang="en-US" dirty="0"/>
-              <a:t>12/15/2017</a:t>
+              <a:t>12/21/2017</a:t>
             </a:fld>
             <a:endParaRPr lang="en-US" dirty="0"/>
           </a:p>
@@ -790,7 +790,7 @@
           <a:p>
             <a:fld id="{4509A250-FF31-4206-8172-F9D3106AACB1}" type="datetimeFigureOut">
               <a:rPr lang="en-US" dirty="0"/>
-              <a:t>12/15/2017</a:t>
+              <a:t>12/21/2017</a:t>
             </a:fld>
             <a:endParaRPr lang="en-US" dirty="0"/>
           </a:p>
@@ -1058,7 +1058,7 @@
           <a:p>
             <a:fld id="{4509A250-FF31-4206-8172-F9D3106AACB1}" type="datetimeFigureOut">
               <a:rPr lang="en-US" dirty="0"/>
-              <a:t>12/15/2017</a:t>
+              <a:t>12/21/2017</a:t>
             </a:fld>
             <a:endParaRPr lang="en-US" dirty="0"/>
           </a:p>
@@ -1394,7 +1394,7 @@
           <a:p>
             <a:fld id="{4509A250-FF31-4206-8172-F9D3106AACB1}" type="datetimeFigureOut">
               <a:rPr lang="en-US" dirty="0"/>
-              <a:t>12/15/2017</a:t>
+              <a:t>12/21/2017</a:t>
             </a:fld>
             <a:endParaRPr lang="en-US" dirty="0"/>
           </a:p>
@@ -2012,7 +2012,7 @@
           <a:p>
             <a:fld id="{4509A250-FF31-4206-8172-F9D3106AACB1}" type="datetimeFigureOut">
               <a:rPr lang="en-US" dirty="0"/>
-              <a:t>12/15/2017</a:t>
+              <a:t>12/21/2017</a:t>
             </a:fld>
             <a:endParaRPr lang="en-US" dirty="0"/>
           </a:p>
@@ -2867,7 +2867,7 @@
           <a:p>
             <a:fld id="{4509A250-FF31-4206-8172-F9D3106AACB1}" type="datetimeFigureOut">
               <a:rPr lang="en-US" dirty="0"/>
-              <a:t>12/15/2017</a:t>
+              <a:t>12/21/2017</a:t>
             </a:fld>
             <a:endParaRPr lang="en-US" dirty="0"/>
           </a:p>
@@ -3032,7 +3032,7 @@
           <a:p>
             <a:fld id="{4509A250-FF31-4206-8172-F9D3106AACB1}" type="datetimeFigureOut">
               <a:rPr lang="en-US" dirty="0"/>
-              <a:t>12/15/2017</a:t>
+              <a:t>12/21/2017</a:t>
             </a:fld>
             <a:endParaRPr lang="en-US" dirty="0"/>
           </a:p>
@@ -3207,7 +3207,7 @@
           <a:p>
             <a:fld id="{4509A250-FF31-4206-8172-F9D3106AACB1}" type="datetimeFigureOut">
               <a:rPr lang="en-US" dirty="0"/>
-              <a:t>12/15/2017</a:t>
+              <a:t>12/21/2017</a:t>
             </a:fld>
             <a:endParaRPr lang="en-US" dirty="0"/>
           </a:p>
@@ -3372,7 +3372,7 @@
           <a:p>
             <a:fld id="{4509A250-FF31-4206-8172-F9D3106AACB1}" type="datetimeFigureOut">
               <a:rPr lang="en-US" dirty="0"/>
-              <a:t>12/15/2017</a:t>
+              <a:t>12/21/2017</a:t>
             </a:fld>
             <a:endParaRPr lang="en-US" dirty="0"/>
           </a:p>
@@ -3614,7 +3614,7 @@
           <a:p>
             <a:fld id="{9796027F-7875-4030-9381-8BD8C4F21935}" type="datetimeFigureOut">
               <a:rPr lang="en-US" dirty="0"/>
-              <a:t>12/15/2017</a:t>
+              <a:t>12/21/2017</a:t>
             </a:fld>
             <a:endParaRPr lang="en-US" dirty="0"/>
           </a:p>
@@ -3901,7 +3901,7 @@
           <a:p>
             <a:fld id="{9796027F-7875-4030-9381-8BD8C4F21935}" type="datetimeFigureOut">
               <a:rPr lang="en-US" dirty="0"/>
-              <a:t>12/15/2017</a:t>
+              <a:t>12/21/2017</a:t>
             </a:fld>
             <a:endParaRPr lang="en-US" dirty="0"/>
           </a:p>
@@ -4340,7 +4340,7 @@
           <a:p>
             <a:fld id="{9796027F-7875-4030-9381-8BD8C4F21935}" type="datetimeFigureOut">
               <a:rPr lang="en-US" dirty="0"/>
-              <a:t>12/15/2017</a:t>
+              <a:t>12/21/2017</a:t>
             </a:fld>
             <a:endParaRPr lang="en-US" dirty="0"/>
           </a:p>
@@ -4453,7 +4453,7 @@
           <a:p>
             <a:fld id="{4509A250-FF31-4206-8172-F9D3106AACB1}" type="datetimeFigureOut">
               <a:rPr lang="en-US" dirty="0"/>
-              <a:t>12/15/2017</a:t>
+              <a:t>12/21/2017</a:t>
             </a:fld>
             <a:endParaRPr lang="en-US" dirty="0"/>
           </a:p>
@@ -4543,7 +4543,7 @@
           <a:p>
             <a:fld id="{4509A250-FF31-4206-8172-F9D3106AACB1}" type="datetimeFigureOut">
               <a:rPr lang="en-US" dirty="0"/>
-              <a:t>12/15/2017</a:t>
+              <a:t>12/21/2017</a:t>
             </a:fld>
             <a:endParaRPr lang="en-US" dirty="0"/>
           </a:p>
@@ -4817,7 +4817,7 @@
           <a:p>
             <a:fld id="{4509A250-FF31-4206-8172-F9D3106AACB1}" type="datetimeFigureOut">
               <a:rPr lang="en-US" dirty="0"/>
-              <a:t>12/15/2017</a:t>
+              <a:t>12/21/2017</a:t>
             </a:fld>
             <a:endParaRPr lang="en-US" dirty="0"/>
           </a:p>
@@ -5087,7 +5087,7 @@
           <a:p>
             <a:fld id="{4509A250-FF31-4206-8172-F9D3106AACB1}" type="datetimeFigureOut">
               <a:rPr lang="en-US" dirty="0"/>
-              <a:t>12/15/2017</a:t>
+              <a:t>12/21/2017</a:t>
             </a:fld>
             <a:endParaRPr lang="en-US" dirty="0"/>
           </a:p>
@@ -5511,7 +5511,7 @@
           <a:p>
             <a:fld id="{4AAD347D-5ACD-4C99-B74B-A9C85AD731AF}" type="datetimeFigureOut">
               <a:rPr lang="en-US" dirty="0"/>
-              <a:t>12/15/2017</a:t>
+              <a:t>12/21/2017</a:t>
             </a:fld>
             <a:endParaRPr lang="en-US" dirty="0"/>
           </a:p>
@@ -22025,15 +22025,7 @@
           <a:p>
             <a:r>
               <a:rPr lang="en-US" dirty="0"/>
-              <a:t>Also, the list of objects can be prepared inside the function and returned as a result. After that the list of objects can be added to the knowledge base by single </a:t>
-            </a:r>
-            <a:r>
-              <a:rPr lang="en-US" dirty="0" err="1"/>
-              <a:t>satement</a:t>
-            </a:r>
-            <a:r>
-              <a:rPr lang="en-US" dirty="0"/>
-              <a:t> </a:t>
+              <a:t>Also, the list of objects can be prepared inside the function and returned as a result. After that the list of objects can be added to the knowledge base by single statement </a:t>
             </a:r>
             <a:r>
               <a:rPr lang="ru-RU" dirty="0"/>
@@ -23880,7 +23872,7 @@
                   <a:srgbClr val="CCFF99"/>
                 </a:solidFill>
               </a:rPr>
-              <a:t> = "Search...", element = $</a:t>
+              <a:t> = "Search...", element = </a:t>
             </a:r>
             <a:r>
               <a:rPr lang="en-US" sz="1600" i="1" dirty="0" err="1">
@@ -24307,7 +24299,7 @@
                   <a:srgbClr val="CCFF99"/>
                 </a:solidFill>
               </a:rPr>
-              <a:t>ProductTile</a:t>
+              <a:t>productTile</a:t>
             </a:r>
             <a:r>
               <a:rPr lang="en-US" i="1" dirty="0">
@@ -24416,7 +24408,7 @@
                   <a:srgbClr val="CCFF99"/>
                 </a:solidFill>
               </a:rPr>
-              <a:t>ProductAvailability</a:t>
+              <a:t>productAvailability</a:t>
             </a:r>
             <a:r>
               <a:rPr lang="en-US" i="1" dirty="0">
@@ -24581,7 +24573,7 @@
                   <a:srgbClr val="CCFF99"/>
                 </a:solidFill>
               </a:rPr>
-              <a:t>    if (color == "Brown") { return "green"; };</a:t>
+              <a:t>    if (color == "Brown") { return “yellow"; };</a:t>
             </a:r>
           </a:p>
           <a:p>

</xml_diff>